<commit_message>
wine files updated; final updates to pres and report
</commit_message>
<xml_diff>
--- a/proj1/presentation/pres.pptx
+++ b/proj1/presentation/pres.pptx
@@ -186,14 +186,12 @@
               </a:defRPr>
             </a:pPr>
             <a:r>
-              <a:rPr lang="en-US" sz="1400" b="1" i="0" u="none" strike="noStrike" baseline="0">
-                <a:effectLst/>
-              </a:rPr>
-              <a:t>Average Accuracy on Changing Number of Relevant Attributes (3-NN)</a:t>
-            </a:r>
-            <a:r>
-              <a:rPr lang="en-US" sz="1400" b="0" i="0" u="none" strike="noStrike" baseline="0"/>
-              <a:t> </a:t>
+              <a:rPr lang="en-US"/>
+              <a:t>Average Accuracy on Changing Number of Relevant</a:t>
+            </a:r>
+            <a:r>
+              <a:rPr lang="en-US" baseline="0"/>
+              <a:t> Attributes (3-NN)</a:t>
             </a:r>
             <a:endParaRPr lang="en-US"/>
           </a:p>
@@ -232,14 +230,14 @@
     <c:autoTitleDeleted val="0"/>
     <c:plotArea>
       <c:layout/>
-      <c:lineChart>
-        <c:grouping val="standard"/>
+      <c:scatterChart>
+        <c:scatterStyle val="lineMarker"/>
         <c:varyColors val="0"/>
         <c:ser>
           <c:idx val="0"/>
           <c:order val="0"/>
           <c:spPr>
-            <a:ln w="19050" cap="rnd">
+            <a:ln w="57150" cap="rnd">
               <a:solidFill>
                 <a:schemeClr val="accent1"/>
               </a:solidFill>
@@ -248,14 +246,26 @@
             <a:effectLst/>
           </c:spPr>
           <c:marker>
-            <c:symbol val="none"/>
+            <c:symbol val="circle"/>
+            <c:size val="5"/>
+            <c:spPr>
+              <a:solidFill>
+                <a:schemeClr val="accent1"/>
+              </a:solidFill>
+              <a:ln w="57150">
+                <a:solidFill>
+                  <a:schemeClr val="accent1"/>
+                </a:solidFill>
+              </a:ln>
+              <a:effectLst/>
+            </c:spPr>
           </c:marker>
-          <c:cat>
+          <c:xVal>
             <c:numRef>
-              <c:f>Sheet1!$Y$5:$Y$10</c:f>
+              <c:f>Sheet1!$Y$5:$Y$9</c:f>
               <c:numCache>
                 <c:formatCode>General</c:formatCode>
-                <c:ptCount val="6"/>
+                <c:ptCount val="5"/>
                 <c:pt idx="0">
                   <c:v>2.0</c:v>
                 </c:pt>
@@ -271,45 +281,34 @@
                 <c:pt idx="4">
                   <c:v>10.0</c:v>
                 </c:pt>
-                <c:pt idx="5">
-                  <c:v>12.0</c:v>
+              </c:numCache>
+            </c:numRef>
+          </c:xVal>
+          <c:yVal>
+            <c:numRef>
+              <c:f>Sheet1!$Z$5:$Z$9</c:f>
+              <c:numCache>
+                <c:formatCode>General</c:formatCode>
+                <c:ptCount val="5"/>
+                <c:pt idx="0">
+                  <c:v>78.16743829724631</c:v>
+                </c:pt>
+                <c:pt idx="1">
+                  <c:v>78.10190845516119</c:v>
+                </c:pt>
+                <c:pt idx="2">
+                  <c:v>87.68789142999999</c:v>
+                </c:pt>
+                <c:pt idx="3">
+                  <c:v>92.9490961</c:v>
+                </c:pt>
+                <c:pt idx="4">
+                  <c:v>93.85806732</c:v>
                 </c:pt>
               </c:numCache>
             </c:numRef>
-          </c:cat>
-          <c:val>
-            <c:numRef>
-              <c:f>Sheet1!$Z$5:$Z$10</c:f>
-              <c:numCache>
-                <c:formatCode>General</c:formatCode>
-                <c:ptCount val="6"/>
-                <c:pt idx="0">
-                  <c:v>78.16743829724628</c:v>
-                </c:pt>
-                <c:pt idx="1">
-                  <c:v>78.10190845516118</c:v>
-                </c:pt>
-                <c:pt idx="2">
-                  <c:v>71.2230602387463</c:v>
-                </c:pt>
-                <c:pt idx="3">
-                  <c:v>77.38723781202872</c:v>
-                </c:pt>
-                <c:pt idx="4">
-                  <c:v>83.9412467154564</c:v>
-                </c:pt>
-                <c:pt idx="5">
-                  <c:v>85.0806595846384</c:v>
-                </c:pt>
-              </c:numCache>
-            </c:numRef>
-          </c:val>
+          </c:yVal>
           <c:smooth val="0"/>
-          <c:extLst xmlns:c16r2="http://schemas.microsoft.com/office/drawing/2015/06/chart">
-            <c:ext xmlns:c16="http://schemas.microsoft.com/office/drawing/2014/chart" uri="{C3380CC4-5D6E-409C-BE32-E72D297353CC}">
-              <c16:uniqueId val="{00000000-61AA-4B72-ACB0-515BF1584546}"/>
-            </c:ext>
-          </c:extLst>
         </c:ser>
         <c:dLbls>
           <c:showLegendKey val="0"/>
@@ -319,12 +318,11 @@
           <c:showPercent val="0"/>
           <c:showBubbleSize val="0"/>
         </c:dLbls>
-        <c:smooth val="0"/>
-        <c:axId val="-2009565952"/>
-        <c:axId val="-2083862608"/>
-      </c:lineChart>
-      <c:catAx>
-        <c:axId val="-2009565952"/>
+        <c:axId val="-2039654736"/>
+        <c:axId val="-2039521744"/>
+      </c:scatterChart>
+      <c:valAx>
+        <c:axId val="-2039654736"/>
         <c:scaling>
           <c:orientation val="minMax"/>
         </c:scaling>
@@ -344,68 +342,6 @@
             <a:effectLst/>
           </c:spPr>
         </c:majorGridlines>
-        <c:title>
-          <c:tx>
-            <c:rich>
-              <a:bodyPr rot="0" spcFirstLastPara="1" vertOverflow="ellipsis" vert="horz" wrap="square" anchor="ctr" anchorCtr="1"/>
-              <a:lstStyle/>
-              <a:p>
-                <a:pPr>
-                  <a:defRPr sz="1000" b="0" i="0" u="none" strike="noStrike" kern="1200" baseline="0">
-                    <a:solidFill>
-                      <a:schemeClr val="tx1">
-                        <a:lumMod val="65000"/>
-                        <a:lumOff val="35000"/>
-                      </a:schemeClr>
-                    </a:solidFill>
-                    <a:latin typeface="+mn-lt"/>
-                    <a:ea typeface="+mn-ea"/>
-                    <a:cs typeface="+mn-cs"/>
-                  </a:defRPr>
-                </a:pPr>
-                <a:r>
-                  <a:rPr lang="en-US"/>
-                  <a:t>Number of Relevant</a:t>
-                </a:r>
-                <a:r>
-                  <a:rPr lang="en-US" baseline="0"/>
-                  <a:t> Attributes</a:t>
-                </a:r>
-                <a:endParaRPr lang="en-US"/>
-              </a:p>
-            </c:rich>
-          </c:tx>
-          <c:layout/>
-          <c:overlay val="0"/>
-          <c:spPr>
-            <a:noFill/>
-            <a:ln>
-              <a:noFill/>
-            </a:ln>
-            <a:effectLst/>
-          </c:spPr>
-          <c:txPr>
-            <a:bodyPr rot="0" spcFirstLastPara="1" vertOverflow="ellipsis" vert="horz" wrap="square" anchor="ctr" anchorCtr="1"/>
-            <a:lstStyle/>
-            <a:p>
-              <a:pPr>
-                <a:defRPr sz="1000" b="0" i="0" u="none" strike="noStrike" kern="1200" baseline="0">
-                  <a:solidFill>
-                    <a:schemeClr val="tx1">
-                      <a:lumMod val="65000"/>
-                      <a:lumOff val="35000"/>
-                    </a:schemeClr>
-                  </a:solidFill>
-                  <a:latin typeface="+mn-lt"/>
-                  <a:ea typeface="+mn-ea"/>
-                  <a:cs typeface="+mn-cs"/>
-                </a:defRPr>
-              </a:pPr>
-              <a:endParaRPr lang="en-US"/>
-            </a:p>
-          </c:txPr>
-        </c:title>
-        <c:numFmt formatCode="General" sourceLinked="1"/>
         <c:majorTickMark val="none"/>
         <c:minorTickMark val="none"/>
         <c:tickLblPos val="nextTo"/>
@@ -442,15 +378,12 @@
             <a:endParaRPr lang="en-US"/>
           </a:p>
         </c:txPr>
-        <c:crossAx val="-2083862608"/>
+        <c:crossAx val="-2039521744"/>
         <c:crosses val="autoZero"/>
-        <c:auto val="1"/>
-        <c:lblAlgn val="ctr"/>
-        <c:lblOffset val="100"/>
-        <c:noMultiLvlLbl val="0"/>
-      </c:catAx>
+        <c:crossBetween val="midCat"/>
+      </c:valAx>
       <c:valAx>
-        <c:axId val="-2083862608"/>
+        <c:axId val="-2039521744"/>
         <c:scaling>
           <c:orientation val="minMax"/>
         </c:scaling>
@@ -470,62 +403,6 @@
             <a:effectLst/>
           </c:spPr>
         </c:majorGridlines>
-        <c:title>
-          <c:tx>
-            <c:rich>
-              <a:bodyPr rot="-5400000" spcFirstLastPara="1" vertOverflow="ellipsis" vert="horz" wrap="square" anchor="ctr" anchorCtr="1"/>
-              <a:lstStyle/>
-              <a:p>
-                <a:pPr>
-                  <a:defRPr sz="1000" b="0" i="0" u="none" strike="noStrike" kern="1200" baseline="0">
-                    <a:solidFill>
-                      <a:schemeClr val="tx1">
-                        <a:lumMod val="65000"/>
-                        <a:lumOff val="35000"/>
-                      </a:schemeClr>
-                    </a:solidFill>
-                    <a:latin typeface="+mn-lt"/>
-                    <a:ea typeface="+mn-ea"/>
-                    <a:cs typeface="+mn-cs"/>
-                  </a:defRPr>
-                </a:pPr>
-                <a:r>
-                  <a:rPr lang="en-US"/>
-                  <a:t>Accuracy Rate</a:t>
-                </a:r>
-              </a:p>
-            </c:rich>
-          </c:tx>
-          <c:layout/>
-          <c:overlay val="0"/>
-          <c:spPr>
-            <a:noFill/>
-            <a:ln>
-              <a:noFill/>
-            </a:ln>
-            <a:effectLst/>
-          </c:spPr>
-          <c:txPr>
-            <a:bodyPr rot="-5400000" spcFirstLastPara="1" vertOverflow="ellipsis" vert="horz" wrap="square" anchor="ctr" anchorCtr="1"/>
-            <a:lstStyle/>
-            <a:p>
-              <a:pPr>
-                <a:defRPr sz="1000" b="0" i="0" u="none" strike="noStrike" kern="1200" baseline="0">
-                  <a:solidFill>
-                    <a:schemeClr val="tx1">
-                      <a:lumMod val="65000"/>
-                      <a:lumOff val="35000"/>
-                    </a:schemeClr>
-                  </a:solidFill>
-                  <a:latin typeface="+mn-lt"/>
-                  <a:ea typeface="+mn-ea"/>
-                  <a:cs typeface="+mn-cs"/>
-                </a:defRPr>
-              </a:pPr>
-              <a:endParaRPr lang="en-US"/>
-            </a:p>
-          </c:txPr>
-        </c:title>
         <c:numFmt formatCode="General" sourceLinked="0"/>
         <c:majorTickMark val="none"/>
         <c:minorTickMark val="none"/>
@@ -563,9 +440,9 @@
             <a:endParaRPr lang="en-US"/>
           </a:p>
         </c:txPr>
-        <c:crossAx val="-2009565952"/>
+        <c:crossAx val="-2039654736"/>
         <c:crosses val="autoZero"/>
-        <c:crossBetween val="between"/>
+        <c:crossBetween val="midCat"/>
       </c:valAx>
       <c:spPr>
         <a:noFill/>
@@ -1591,6 +1468,90 @@
 </p:notes>
 </file>
 
+<file path=ppt/notesSlides/notesSlide2.xml><?xml version="1.0" encoding="utf-8"?>
+<p:notes xmlns:a="http://schemas.openxmlformats.org/drawingml/2006/main" xmlns:r="http://schemas.openxmlformats.org/officeDocument/2006/relationships" xmlns:p="http://schemas.openxmlformats.org/presentationml/2006/main">
+  <p:cSld>
+    <p:spTree>
+      <p:nvGrpSpPr>
+        <p:cNvPr id="1" name=""/>
+        <p:cNvGrpSpPr/>
+        <p:nvPr/>
+      </p:nvGrpSpPr>
+      <p:grpSpPr>
+        <a:xfrm>
+          <a:off x="0" y="0"/>
+          <a:ext cx="0" cy="0"/>
+          <a:chOff x="0" y="0"/>
+          <a:chExt cx="0" cy="0"/>
+        </a:xfrm>
+      </p:grpSpPr>
+      <p:sp>
+        <p:nvSpPr>
+          <p:cNvPr id="2" name="Slide Image Placeholder 1"/>
+          <p:cNvSpPr>
+            <a:spLocks noGrp="1" noRot="1" noChangeAspect="1"/>
+          </p:cNvSpPr>
+          <p:nvPr>
+            <p:ph type="sldImg"/>
+          </p:nvPr>
+        </p:nvSpPr>
+        <p:spPr/>
+      </p:sp>
+      <p:sp>
+        <p:nvSpPr>
+          <p:cNvPr id="3" name="Notes Placeholder 2"/>
+          <p:cNvSpPr>
+            <a:spLocks noGrp="1"/>
+          </p:cNvSpPr>
+          <p:nvPr>
+            <p:ph type="body" idx="1"/>
+          </p:nvPr>
+        </p:nvSpPr>
+        <p:spPr/>
+        <p:txBody>
+          <a:bodyPr/>
+          <a:lstStyle/>
+          <a:p>
+            <a:endParaRPr lang="en-US" dirty="0"/>
+          </a:p>
+        </p:txBody>
+      </p:sp>
+      <p:sp>
+        <p:nvSpPr>
+          <p:cNvPr id="4" name="Slide Number Placeholder 3"/>
+          <p:cNvSpPr>
+            <a:spLocks noGrp="1"/>
+          </p:cNvSpPr>
+          <p:nvPr>
+            <p:ph type="sldNum" sz="quarter" idx="10"/>
+          </p:nvPr>
+        </p:nvSpPr>
+        <p:spPr/>
+        <p:txBody>
+          <a:bodyPr/>
+          <a:lstStyle/>
+          <a:p>
+            <a:fld id="{E7CF0A7C-AE6E-614B-B62E-5AD94D73F6A0}" type="slidenum">
+              <a:rPr lang="en-US" smtClean="0"/>
+              <a:t>33</a:t>
+            </a:fld>
+            <a:endParaRPr lang="en-US"/>
+          </a:p>
+        </p:txBody>
+      </p:sp>
+    </p:spTree>
+    <p:extLst>
+      <p:ext uri="{BB962C8B-B14F-4D97-AF65-F5344CB8AC3E}">
+        <p14:creationId xmlns:p14="http://schemas.microsoft.com/office/powerpoint/2010/main" val="1385101283"/>
+      </p:ext>
+    </p:extLst>
+  </p:cSld>
+  <p:clrMapOvr>
+    <a:masterClrMapping/>
+  </p:clrMapOvr>
+</p:notes>
+</file>
+
 <file path=ppt/slideLayouts/slideLayout1.xml><?xml version="1.0" encoding="utf-8"?>
 <p:sldLayout xmlns:a="http://schemas.openxmlformats.org/drawingml/2006/main" xmlns:r="http://schemas.openxmlformats.org/officeDocument/2006/relationships" xmlns:p="http://schemas.openxmlformats.org/presentationml/2006/main" showMasterSp="0" type="title" preserve="1">
   <p:cSld name="Title Slide">
@@ -8683,21 +8644,21 @@
                 <a:gridCol w="2227006">
                   <a:extLst>
                     <a:ext uri="{9D8B030D-6E8A-4147-A177-3AD203B41FA5}">
-                      <a16:colId xmlns:a16="http://schemas.microsoft.com/office/drawing/2014/main" xmlns="" val="20000"/>
+                      <a16:colId xmlns="" xmlns:a16="http://schemas.microsoft.com/office/drawing/2014/main" val="20000"/>
                     </a:ext>
                   </a:extLst>
                 </a:gridCol>
                 <a:gridCol w="2227006">
                   <a:extLst>
                     <a:ext uri="{9D8B030D-6E8A-4147-A177-3AD203B41FA5}">
-                      <a16:colId xmlns:a16="http://schemas.microsoft.com/office/drawing/2014/main" xmlns="" val="20001"/>
+                      <a16:colId xmlns="" xmlns:a16="http://schemas.microsoft.com/office/drawing/2014/main" val="20001"/>
                     </a:ext>
                   </a:extLst>
                 </a:gridCol>
                 <a:gridCol w="2227006">
                   <a:extLst>
                     <a:ext uri="{9D8B030D-6E8A-4147-A177-3AD203B41FA5}">
-                      <a16:colId xmlns:a16="http://schemas.microsoft.com/office/drawing/2014/main" xmlns="" val="20002"/>
+                      <a16:colId xmlns="" xmlns:a16="http://schemas.microsoft.com/office/drawing/2014/main" val="20002"/>
                     </a:ext>
                   </a:extLst>
                 </a:gridCol>
@@ -8783,7 +8744,7 @@
                 </a:tc>
                 <a:extLst>
                   <a:ext uri="{0D108BD9-81ED-4DB2-BD59-A6C34878D82A}">
-                    <a16:rowId xmlns:a16="http://schemas.microsoft.com/office/drawing/2014/main" xmlns="" val="10000"/>
+                    <a16:rowId xmlns="" xmlns:a16="http://schemas.microsoft.com/office/drawing/2014/main" val="10000"/>
                   </a:ext>
                 </a:extLst>
               </a:tr>
@@ -8859,7 +8820,7 @@
                 </a:tc>
                 <a:extLst>
                   <a:ext uri="{0D108BD9-81ED-4DB2-BD59-A6C34878D82A}">
-                    <a16:rowId xmlns:a16="http://schemas.microsoft.com/office/drawing/2014/main" xmlns="" val="10001"/>
+                    <a16:rowId xmlns="" xmlns:a16="http://schemas.microsoft.com/office/drawing/2014/main" val="10001"/>
                   </a:ext>
                 </a:extLst>
               </a:tr>
@@ -8935,7 +8896,7 @@
                 </a:tc>
                 <a:extLst>
                   <a:ext uri="{0D108BD9-81ED-4DB2-BD59-A6C34878D82A}">
-                    <a16:rowId xmlns:a16="http://schemas.microsoft.com/office/drawing/2014/main" xmlns="" val="10002"/>
+                    <a16:rowId xmlns="" xmlns:a16="http://schemas.microsoft.com/office/drawing/2014/main" val="10002"/>
                   </a:ext>
                 </a:extLst>
               </a:tr>
@@ -9011,7 +8972,7 @@
                 </a:tc>
                 <a:extLst>
                   <a:ext uri="{0D108BD9-81ED-4DB2-BD59-A6C34878D82A}">
-                    <a16:rowId xmlns:a16="http://schemas.microsoft.com/office/drawing/2014/main" xmlns="" val="10003"/>
+                    <a16:rowId xmlns="" xmlns:a16="http://schemas.microsoft.com/office/drawing/2014/main" val="10003"/>
                   </a:ext>
                 </a:extLst>
               </a:tr>
@@ -9087,7 +9048,7 @@
                 </a:tc>
                 <a:extLst>
                   <a:ext uri="{0D108BD9-81ED-4DB2-BD59-A6C34878D82A}">
-                    <a16:rowId xmlns:a16="http://schemas.microsoft.com/office/drawing/2014/main" xmlns="" val="10004"/>
+                    <a16:rowId xmlns="" xmlns:a16="http://schemas.microsoft.com/office/drawing/2014/main" val="10004"/>
                   </a:ext>
                 </a:extLst>
               </a:tr>
@@ -9163,7 +9124,7 @@
                 </a:tc>
                 <a:extLst>
                   <a:ext uri="{0D108BD9-81ED-4DB2-BD59-A6C34878D82A}">
-                    <a16:rowId xmlns:a16="http://schemas.microsoft.com/office/drawing/2014/main" xmlns="" val="10005"/>
+                    <a16:rowId xmlns="" xmlns:a16="http://schemas.microsoft.com/office/drawing/2014/main" val="10005"/>
                   </a:ext>
                 </a:extLst>
               </a:tr>
@@ -9239,7 +9200,7 @@
                 </a:tc>
                 <a:extLst>
                   <a:ext uri="{0D108BD9-81ED-4DB2-BD59-A6C34878D82A}">
-                    <a16:rowId xmlns:a16="http://schemas.microsoft.com/office/drawing/2014/main" xmlns="" val="10006"/>
+                    <a16:rowId xmlns="" xmlns:a16="http://schemas.microsoft.com/office/drawing/2014/main" val="10006"/>
                   </a:ext>
                 </a:extLst>
               </a:tr>
@@ -9315,7 +9276,7 @@
                 </a:tc>
                 <a:extLst>
                   <a:ext uri="{0D108BD9-81ED-4DB2-BD59-A6C34878D82A}">
-                    <a16:rowId xmlns:a16="http://schemas.microsoft.com/office/drawing/2014/main" xmlns="" val="10007"/>
+                    <a16:rowId xmlns="" xmlns:a16="http://schemas.microsoft.com/office/drawing/2014/main" val="10007"/>
                   </a:ext>
                 </a:extLst>
               </a:tr>
@@ -9391,7 +9352,7 @@
                 </a:tc>
                 <a:extLst>
                   <a:ext uri="{0D108BD9-81ED-4DB2-BD59-A6C34878D82A}">
-                    <a16:rowId xmlns:a16="http://schemas.microsoft.com/office/drawing/2014/main" xmlns="" val="10008"/>
+                    <a16:rowId xmlns="" xmlns:a16="http://schemas.microsoft.com/office/drawing/2014/main" val="10008"/>
                   </a:ext>
                 </a:extLst>
               </a:tr>
@@ -9467,7 +9428,7 @@
                 </a:tc>
                 <a:extLst>
                   <a:ext uri="{0D108BD9-81ED-4DB2-BD59-A6C34878D82A}">
-                    <a16:rowId xmlns:a16="http://schemas.microsoft.com/office/drawing/2014/main" xmlns="" val="10009"/>
+                    <a16:rowId xmlns="" xmlns:a16="http://schemas.microsoft.com/office/drawing/2014/main" val="10009"/>
                   </a:ext>
                 </a:extLst>
               </a:tr>
@@ -9543,7 +9504,7 @@
                 </a:tc>
                 <a:extLst>
                   <a:ext uri="{0D108BD9-81ED-4DB2-BD59-A6C34878D82A}">
-                    <a16:rowId xmlns:a16="http://schemas.microsoft.com/office/drawing/2014/main" xmlns="" val="10010"/>
+                    <a16:rowId xmlns="" xmlns:a16="http://schemas.microsoft.com/office/drawing/2014/main" val="10010"/>
                   </a:ext>
                 </a:extLst>
               </a:tr>
@@ -9611,7 +9572,7 @@
                 </a:tc>
                 <a:extLst>
                   <a:ext uri="{0D108BD9-81ED-4DB2-BD59-A6C34878D82A}">
-                    <a16:rowId xmlns:a16="http://schemas.microsoft.com/office/drawing/2014/main" xmlns="" val="10011"/>
+                    <a16:rowId xmlns="" xmlns:a16="http://schemas.microsoft.com/office/drawing/2014/main" val="10011"/>
                   </a:ext>
                 </a:extLst>
               </a:tr>
@@ -9894,7 +9855,7 @@
         </p:nvSpPr>
         <p:spPr>
           <a:xfrm>
-            <a:off x="4173793" y="2839064"/>
+            <a:off x="3790335" y="2868561"/>
             <a:ext cx="9601200" cy="1485900"/>
           </a:xfrm>
         </p:spPr>
@@ -9906,8 +9867,21 @@
           <a:p>
             <a:r>
               <a:rPr lang="en-US" sz="4800" dirty="0"/>
-              <a:t>The results!</a:t>
-            </a:r>
+              <a:t>The </a:t>
+            </a:r>
+            <a:r>
+              <a:rPr lang="en-US" sz="4800" dirty="0" smtClean="0"/>
+              <a:t>results</a:t>
+            </a:r>
+            <a:r>
+              <a:rPr lang="en-US" sz="4800" dirty="0"/>
+              <a:t>!</a:t>
+            </a:r>
+            <a:r>
+              <a:rPr lang="en-US" sz="4800" dirty="0" smtClean="0"/>
+              <a:t> 🎉</a:t>
+            </a:r>
+            <a:endParaRPr lang="en-US" sz="4800" dirty="0"/>
           </a:p>
         </p:txBody>
       </p:sp>
@@ -11331,12 +11305,30 @@
               <a:t>how does the addition of </a:t>
             </a:r>
             <a:r>
-              <a:rPr lang="en-US" b="1" dirty="0"/>
+              <a:rPr lang="en-US" b="1" dirty="0">
+                <a:solidFill>
+                  <a:schemeClr val="tx2">
+                    <a:lumMod val="50000"/>
+                    <a:lumOff val="50000"/>
+                  </a:schemeClr>
+                </a:solidFill>
+              </a:rPr>
               <a:t>relevant</a:t>
             </a:r>
             <a:r>
+              <a:rPr lang="en-US" dirty="0">
+                <a:solidFill>
+                  <a:schemeClr val="tx2">
+                    <a:lumMod val="50000"/>
+                    <a:lumOff val="50000"/>
+                  </a:schemeClr>
+                </a:solidFill>
+              </a:rPr>
+              <a:t> </a:t>
+            </a:r>
+            <a:r>
               <a:rPr lang="en-US" dirty="0"/>
-              <a:t> attributes affect classification?</a:t>
+              <a:t>attributes affect classification?</a:t>
             </a:r>
           </a:p>
         </p:txBody>
@@ -11421,7 +11413,16 @@
                 </a:solidFill>
                 <a:latin typeface="+mn-lt"/>
               </a:rPr>
-              <a:t>(Modified!) </a:t>
+              <a:t>(</a:t>
+            </a:r>
+            <a:r>
+              <a:rPr lang="en-US" sz="3100" dirty="0" smtClean="0">
+                <a:solidFill>
+                  <a:srgbClr val="7030A0"/>
+                </a:solidFill>
+                <a:latin typeface="+mn-lt"/>
+              </a:rPr>
+              <a:t>Modified) </a:t>
             </a:r>
             <a:r>
               <a:rPr lang="en-US" dirty="0"/>
@@ -11498,7 +11499,6 @@
               <a:rPr lang="en-US" sz="2600" b="1" dirty="0"/>
               <a:t>phenols</a:t>
             </a:r>
-            <a:endParaRPr lang="en-US" sz="2600" b="1" dirty="0"/>
           </a:p>
           <a:p>
             <a:r>
@@ -11570,31 +11570,6 @@
           <a:chExt cx="0" cy="0"/>
         </a:xfrm>
       </p:grpSpPr>
-      <p:graphicFrame>
-        <p:nvGraphicFramePr>
-          <p:cNvPr id="4" name="Content Placeholder 3"/>
-          <p:cNvGraphicFramePr>
-            <a:graphicFrameLocks noGrp="1"/>
-          </p:cNvGraphicFramePr>
-          <p:nvPr>
-            <p:ph idx="1"/>
-            <p:extLst>
-              <p:ext uri="{D42A27DB-BD31-4B8C-83A1-F6EECF244321}">
-                <p14:modId xmlns:p14="http://schemas.microsoft.com/office/powerpoint/2010/main" val="588086057"/>
-              </p:ext>
-            </p:extLst>
-          </p:nvPr>
-        </p:nvGraphicFramePr>
-        <p:xfrm>
-          <a:off x="1445342" y="1342105"/>
-          <a:ext cx="9807677" cy="5043948"/>
-        </p:xfrm>
-        <a:graphic>
-          <a:graphicData uri="http://schemas.openxmlformats.org/drawingml/2006/chart">
-            <c:chart xmlns:c="http://schemas.openxmlformats.org/drawingml/2006/chart" xmlns:r="http://schemas.openxmlformats.org/officeDocument/2006/relationships" r:id="rId3"/>
-          </a:graphicData>
-        </a:graphic>
-      </p:graphicFrame>
       <p:sp>
         <p:nvSpPr>
           <p:cNvPr id="5" name="TextBox 4"/>
@@ -11637,6 +11612,31 @@
           </a:p>
         </p:txBody>
       </p:sp>
+      <p:graphicFrame>
+        <p:nvGraphicFramePr>
+          <p:cNvPr id="7" name="Content Placeholder 6"/>
+          <p:cNvGraphicFramePr>
+            <a:graphicFrameLocks noGrp="1"/>
+          </p:cNvGraphicFramePr>
+          <p:nvPr>
+            <p:ph idx="1"/>
+            <p:extLst>
+              <p:ext uri="{D42A27DB-BD31-4B8C-83A1-F6EECF244321}">
+                <p14:modId xmlns:p14="http://schemas.microsoft.com/office/powerpoint/2010/main" val="1270805037"/>
+              </p:ext>
+            </p:extLst>
+          </p:nvPr>
+        </p:nvGraphicFramePr>
+        <p:xfrm>
+          <a:off x="1342102" y="1445341"/>
+          <a:ext cx="10146892" cy="4984955"/>
+        </p:xfrm>
+        <a:graphic>
+          <a:graphicData uri="http://schemas.openxmlformats.org/drawingml/2006/chart">
+            <c:chart xmlns:c="http://schemas.openxmlformats.org/drawingml/2006/chart" xmlns:r="http://schemas.openxmlformats.org/officeDocument/2006/relationships" r:id="rId3"/>
+          </a:graphicData>
+        </a:graphic>
+      </p:graphicFrame>
     </p:spTree>
     <p:extLst>
       <p:ext uri="{BB962C8B-B14F-4D97-AF65-F5344CB8AC3E}">
@@ -11886,13 +11886,11 @@
       </p:sp>
       <p:pic>
         <p:nvPicPr>
-          <p:cNvPr id="5" name="Content Placeholder 4"/>
+          <p:cNvPr id="3" name="Picture 2"/>
           <p:cNvPicPr>
-            <a:picLocks noGrp="1" noChangeAspect="1"/>
+            <a:picLocks noChangeAspect="1"/>
           </p:cNvPicPr>
-          <p:nvPr>
-            <p:ph idx="1"/>
-          </p:nvPr>
+          <p:nvPr/>
         </p:nvPicPr>
         <p:blipFill>
           <a:blip r:embed="rId2">
@@ -11908,9 +11906,12 @@
         </p:blipFill>
         <p:spPr>
           <a:xfrm>
-            <a:off x="3178864" y="1286539"/>
-            <a:ext cx="7007127" cy="5255346"/>
+            <a:off x="3059151" y="1507765"/>
+            <a:ext cx="6563376" cy="4922532"/>
           </a:xfrm>
+          <a:prstGeom prst="rect">
+            <a:avLst/>
+          </a:prstGeom>
         </p:spPr>
       </p:pic>
     </p:spTree>
@@ -11975,13 +11976,11 @@
       </p:sp>
       <p:pic>
         <p:nvPicPr>
-          <p:cNvPr id="3" name="Content Placeholder 2"/>
+          <p:cNvPr id="2" name="Picture 1"/>
           <p:cNvPicPr>
-            <a:picLocks noGrp="1" noChangeAspect="1"/>
+            <a:picLocks noChangeAspect="1"/>
           </p:cNvPicPr>
-          <p:nvPr>
-            <p:ph idx="1"/>
-          </p:nvPr>
+          <p:nvPr/>
         </p:nvPicPr>
         <p:blipFill>
           <a:blip r:embed="rId2">
@@ -11997,9 +11996,12 @@
         </p:blipFill>
         <p:spPr>
           <a:xfrm>
-            <a:off x="3221394" y="1307803"/>
-            <a:ext cx="7049657" cy="5287243"/>
+            <a:off x="3048330" y="1364635"/>
+            <a:ext cx="6585017" cy="4938763"/>
           </a:xfrm>
+          <a:prstGeom prst="rect">
+            <a:avLst/>
+          </a:prstGeom>
         </p:spPr>
       </p:pic>
     </p:spTree>
@@ -12057,20 +12059,26 @@
           <a:p>
             <a:r>
               <a:rPr lang="en-US" dirty="0"/>
-              <a:t>🍷 Dataset (12 relevant)</a:t>
+              <a:t>🍷 Dataset (</a:t>
+            </a:r>
+            <a:r>
+              <a:rPr lang="en-US" dirty="0" smtClean="0"/>
+              <a:t>10 </a:t>
+            </a:r>
+            <a:r>
+              <a:rPr lang="en-US" dirty="0"/>
+              <a:t>relevant)</a:t>
             </a:r>
           </a:p>
         </p:txBody>
       </p:sp>
       <p:pic>
         <p:nvPicPr>
-          <p:cNvPr id="5" name="Content Placeholder 4"/>
+          <p:cNvPr id="3" name="Picture 2"/>
           <p:cNvPicPr>
-            <a:picLocks noGrp="1" noChangeAspect="1"/>
+            <a:picLocks noChangeAspect="1"/>
           </p:cNvPicPr>
-          <p:nvPr>
-            <p:ph idx="1"/>
-          </p:nvPr>
+          <p:nvPr/>
         </p:nvPicPr>
         <p:blipFill>
           <a:blip r:embed="rId2">
@@ -12086,9 +12094,12 @@
         </p:blipFill>
         <p:spPr>
           <a:xfrm>
-            <a:off x="2746102" y="1128451"/>
-            <a:ext cx="7189474" cy="5392106"/>
+            <a:off x="2960823" y="1349886"/>
+            <a:ext cx="6760031" cy="5070023"/>
           </a:xfrm>
+          <a:prstGeom prst="rect">
+            <a:avLst/>
+          </a:prstGeom>
         </p:spPr>
       </p:pic>
     </p:spTree>
@@ -12196,16 +12207,13 @@
             </a:r>
             <a:r>
               <a:rPr lang="en-US" sz="2400" dirty="0"/>
-              <a:t> domain showed </a:t>
-            </a:r>
-            <a:r>
-              <a:rPr lang="en-US" sz="2400" b="1" dirty="0"/>
-              <a:t>dramatic</a:t>
-            </a:r>
-            <a:r>
-              <a:rPr lang="en-US" sz="2400" dirty="0"/>
-              <a:t> decline.</a:t>
-            </a:r>
+              <a:t> domain showed dramatic decline</a:t>
+            </a:r>
+            <a:r>
+              <a:rPr lang="en-US" sz="2400" dirty="0" smtClean="0"/>
+              <a:t>. </a:t>
+            </a:r>
+            <a:endParaRPr lang="en-US" sz="2400" dirty="0"/>
           </a:p>
           <a:p>
             <a:r>
@@ -12221,22 +12229,27 @@
           <a:p>
             <a:pPr lvl="1"/>
             <a:r>
-              <a:rPr lang="en-US" sz="2200" dirty="0"/>
-              <a:t>Breaking ties </a:t>
-            </a:r>
+              <a:rPr lang="en-US" sz="2200" dirty="0" smtClean="0"/>
+              <a:t>Breaking ties? </a:t>
+            </a:r>
+            <a:endParaRPr lang="en-US" sz="2200" dirty="0"/>
           </a:p>
           <a:p>
             <a:r>
               <a:rPr lang="en-US" sz="2400" dirty="0"/>
-              <a:t>Adding relevant attributes generally </a:t>
-            </a:r>
-            <a:r>
-              <a:rPr lang="en-US" sz="2400" b="1" dirty="0"/>
-              <a:t>enhances</a:t>
+              <a:t>Adding relevant attributes </a:t>
+            </a:r>
+            <a:r>
+              <a:rPr lang="en-US" sz="2400" b="1" dirty="0" smtClean="0"/>
+              <a:t>enhance</a:t>
+            </a:r>
+            <a:r>
+              <a:rPr lang="en-US" sz="2400" dirty="0" smtClean="0"/>
+              <a:t> </a:t>
             </a:r>
             <a:r>
               <a:rPr lang="en-US" sz="2400" dirty="0"/>
-              <a:t> performance. </a:t>
+              <a:t>performance. </a:t>
             </a:r>
             <a:endParaRPr lang="en-US" sz="2400" dirty="0" smtClean="0"/>
           </a:p>
@@ -12638,23 +12651,29 @@
               <a:rPr lang="en-US" sz="2800" dirty="0">
                 <a:sym typeface="Wingdings"/>
               </a:rPr>
-              <a:t>Training set may not be representative			           </a:t>
+              <a:t>Training set may not be </a:t>
             </a:r>
             <a:r>
               <a:rPr lang="en-US" sz="2800" dirty="0" smtClean="0">
                 <a:sym typeface="Wingdings"/>
               </a:rPr>
-              <a:t> </a:t>
-            </a:r>
-            <a:r>
-              <a:rPr lang="en-US" sz="2800" b="1" dirty="0"/>
+              <a:t>representative</a:t>
+            </a:r>
+            <a:endParaRPr lang="en-US" sz="2800" dirty="0">
+              <a:sym typeface="Wingdings"/>
+            </a:endParaRPr>
+          </a:p>
+          <a:p>
+            <a:pPr lvl="1"/>
+            <a:r>
+              <a:rPr lang="en-US" sz="2600" b="1" dirty="0" smtClean="0"/>
               <a:t>Random </a:t>
             </a:r>
             <a:r>
-              <a:rPr lang="en-US" sz="2800" b="1" dirty="0" smtClean="0"/>
+              <a:rPr lang="en-US" sz="2600" b="1" dirty="0" smtClean="0"/>
               <a:t>subsampling</a:t>
             </a:r>
-            <a:endParaRPr lang="en-US" sz="2800" b="1" dirty="0"/>
+            <a:endParaRPr lang="en-US" sz="2600" b="1" dirty="0"/>
           </a:p>
           <a:p>
             <a:r>
@@ -12834,7 +12853,19 @@
             </a:r>
             <a:r>
               <a:rPr lang="en-US" sz="2800" dirty="0" smtClean="0"/>
-              <a:t>alues should not dominate the dataset.</a:t>
+              <a:t>alues should not </a:t>
+            </a:r>
+            <a:r>
+              <a:rPr lang="en-US" sz="2800" b="1" dirty="0" smtClean="0"/>
+              <a:t>dominate</a:t>
+            </a:r>
+            <a:r>
+              <a:rPr lang="en-US" sz="2800" dirty="0" smtClean="0"/>
+              <a:t> the </a:t>
+            </a:r>
+            <a:r>
+              <a:rPr lang="en-US" sz="2800" dirty="0" smtClean="0"/>
+              <a:t>dataset</a:t>
             </a:r>
             <a:endParaRPr lang="en-US" sz="2600" dirty="0" smtClean="0"/>
           </a:p>
@@ -13019,7 +13050,15 @@
           <a:p>
             <a:r>
               <a:rPr lang="en-US" sz="2800" dirty="0"/>
-              <a:t>Add in groups of two until 10 groups are reached</a:t>
+              <a:t>Add in groups of </a:t>
+            </a:r>
+            <a:r>
+              <a:rPr lang="en-US" sz="2800" b="1" dirty="0"/>
+              <a:t>two</a:t>
+            </a:r>
+            <a:r>
+              <a:rPr lang="en-US" sz="2800" dirty="0"/>
+              <a:t> until 10 groups are reached</a:t>
             </a:r>
           </a:p>
           <a:p>
@@ -13033,29 +13072,12 @@
             </a:r>
             <a:r>
               <a:rPr lang="en-US" sz="2800" dirty="0"/>
-              <a:t>, 9-NN.</a:t>
-            </a:r>
-          </a:p>
-          <a:p>
-            <a:r>
-              <a:rPr lang="en-US" sz="2800" dirty="0"/>
-              <a:t>Now, the </a:t>
+              <a:t>, 9-NN</a:t>
             </a:r>
             <a:r>
               <a:rPr lang="en-US" sz="2800" dirty="0" smtClean="0"/>
-              <a:t>datasets</a:t>
-            </a:r>
-            <a:r>
-              <a:rPr lang="mr-IN" sz="2800" dirty="0" smtClean="0"/>
-              <a:t>…</a:t>
-            </a:r>
-            <a:r>
-              <a:rPr lang="en-US" sz="2800" dirty="0" smtClean="0"/>
-              <a:t>  </a:t>
-            </a:r>
-            <a:endParaRPr lang="en-US" sz="2800" dirty="0"/>
-          </a:p>
-          <a:p>
+              <a:t>.</a:t>
+            </a:r>
             <a:endParaRPr lang="en-US" sz="2800" dirty="0"/>
           </a:p>
           <a:p>

</xml_diff>